<commit_message>
Added powerpoint and added to the report
</commit_message>
<xml_diff>
--- a/feasibility.pptx
+++ b/feasibility.pptx
@@ -1,21 +1,116 @@
 
 <file path=ppt/presentation.xml><?xml version="1.0" encoding="utf-8"?>
-<p:presentation xmlns:a="http://schemas.openxmlformats.org/drawingml/2006/main" xmlns:p="http://schemas.openxmlformats.org/presentationml/2006/main" xmlns:r="http://schemas.openxmlformats.org/officeDocument/2006/relationships">
+<p:presentation xmlns:a="http://schemas.openxmlformats.org/drawingml/2006/main" xmlns:r="http://schemas.openxmlformats.org/officeDocument/2006/relationships" xmlns:p="http://schemas.openxmlformats.org/presentationml/2006/main">
   <p:sldMasterIdLst>
-    <p:sldMasterId id="2147483648" r:id="rId2"/>
+    <p:sldMasterId id="2147483648" r:id="rId1"/>
   </p:sldMasterIdLst>
   <p:sldIdLst>
-    <p:sldId id="256" r:id="rId3"/>
-    <p:sldId id="257" r:id="rId4"/>
-    <p:sldId id="258" r:id="rId5"/>
+    <p:sldId id="256" r:id="rId2"/>
+    <p:sldId id="257" r:id="rId3"/>
+    <p:sldId id="258" r:id="rId4"/>
   </p:sldIdLst>
   <p:sldSz cx="10080625" cy="7559675"/>
   <p:notesSz cx="7772400" cy="10058400"/>
+  <p:defaultTextStyle>
+    <a:defPPr>
+      <a:defRPr lang="en-US"/>
+    </a:defPPr>
+    <a:lvl1pPr marL="0" algn="l" defTabSz="914400" rtl="0" eaLnBrk="1" latinLnBrk="0" hangingPunct="1">
+      <a:defRPr sz="1800" kern="1200">
+        <a:solidFill>
+          <a:schemeClr val="tx1"/>
+        </a:solidFill>
+        <a:latin typeface="+mn-lt"/>
+        <a:ea typeface="+mn-ea"/>
+        <a:cs typeface="+mn-cs"/>
+      </a:defRPr>
+    </a:lvl1pPr>
+    <a:lvl2pPr marL="457200" algn="l" defTabSz="914400" rtl="0" eaLnBrk="1" latinLnBrk="0" hangingPunct="1">
+      <a:defRPr sz="1800" kern="1200">
+        <a:solidFill>
+          <a:schemeClr val="tx1"/>
+        </a:solidFill>
+        <a:latin typeface="+mn-lt"/>
+        <a:ea typeface="+mn-ea"/>
+        <a:cs typeface="+mn-cs"/>
+      </a:defRPr>
+    </a:lvl2pPr>
+    <a:lvl3pPr marL="914400" algn="l" defTabSz="914400" rtl="0" eaLnBrk="1" latinLnBrk="0" hangingPunct="1">
+      <a:defRPr sz="1800" kern="1200">
+        <a:solidFill>
+          <a:schemeClr val="tx1"/>
+        </a:solidFill>
+        <a:latin typeface="+mn-lt"/>
+        <a:ea typeface="+mn-ea"/>
+        <a:cs typeface="+mn-cs"/>
+      </a:defRPr>
+    </a:lvl3pPr>
+    <a:lvl4pPr marL="1371600" algn="l" defTabSz="914400" rtl="0" eaLnBrk="1" latinLnBrk="0" hangingPunct="1">
+      <a:defRPr sz="1800" kern="1200">
+        <a:solidFill>
+          <a:schemeClr val="tx1"/>
+        </a:solidFill>
+        <a:latin typeface="+mn-lt"/>
+        <a:ea typeface="+mn-ea"/>
+        <a:cs typeface="+mn-cs"/>
+      </a:defRPr>
+    </a:lvl4pPr>
+    <a:lvl5pPr marL="1828800" algn="l" defTabSz="914400" rtl="0" eaLnBrk="1" latinLnBrk="0" hangingPunct="1">
+      <a:defRPr sz="1800" kern="1200">
+        <a:solidFill>
+          <a:schemeClr val="tx1"/>
+        </a:solidFill>
+        <a:latin typeface="+mn-lt"/>
+        <a:ea typeface="+mn-ea"/>
+        <a:cs typeface="+mn-cs"/>
+      </a:defRPr>
+    </a:lvl5pPr>
+    <a:lvl6pPr marL="2286000" algn="l" defTabSz="914400" rtl="0" eaLnBrk="1" latinLnBrk="0" hangingPunct="1">
+      <a:defRPr sz="1800" kern="1200">
+        <a:solidFill>
+          <a:schemeClr val="tx1"/>
+        </a:solidFill>
+        <a:latin typeface="+mn-lt"/>
+        <a:ea typeface="+mn-ea"/>
+        <a:cs typeface="+mn-cs"/>
+      </a:defRPr>
+    </a:lvl6pPr>
+    <a:lvl7pPr marL="2743200" algn="l" defTabSz="914400" rtl="0" eaLnBrk="1" latinLnBrk="0" hangingPunct="1">
+      <a:defRPr sz="1800" kern="1200">
+        <a:solidFill>
+          <a:schemeClr val="tx1"/>
+        </a:solidFill>
+        <a:latin typeface="+mn-lt"/>
+        <a:ea typeface="+mn-ea"/>
+        <a:cs typeface="+mn-cs"/>
+      </a:defRPr>
+    </a:lvl7pPr>
+    <a:lvl8pPr marL="3200400" algn="l" defTabSz="914400" rtl="0" eaLnBrk="1" latinLnBrk="0" hangingPunct="1">
+      <a:defRPr sz="1800" kern="1200">
+        <a:solidFill>
+          <a:schemeClr val="tx1"/>
+        </a:solidFill>
+        <a:latin typeface="+mn-lt"/>
+        <a:ea typeface="+mn-ea"/>
+        <a:cs typeface="+mn-cs"/>
+      </a:defRPr>
+    </a:lvl8pPr>
+    <a:lvl9pPr marL="3657600" algn="l" defTabSz="914400" rtl="0" eaLnBrk="1" latinLnBrk="0" hangingPunct="1">
+      <a:defRPr sz="1800" kern="1200">
+        <a:solidFill>
+          <a:schemeClr val="tx1"/>
+        </a:solidFill>
+        <a:latin typeface="+mn-lt"/>
+        <a:ea typeface="+mn-ea"/>
+        <a:cs typeface="+mn-cs"/>
+      </a:defRPr>
+    </a:lvl9pPr>
+  </p:defaultTextStyle>
 </p:presentation>
 </file>
 
 <file path=ppt/slideLayouts/slideLayout1.xml><?xml version="1.0" encoding="utf-8"?>
-<p:sldLayout xmlns:a="http://schemas.openxmlformats.org/drawingml/2006/main" xmlns:p="http://schemas.openxmlformats.org/presentationml/2006/main" xmlns:r="http://schemas.openxmlformats.org/officeDocument/2006/relationships" type="blank" preserve="1">
+<p:sldLayout xmlns:a="http://schemas.openxmlformats.org/drawingml/2006/main" xmlns:r="http://schemas.openxmlformats.org/officeDocument/2006/relationships" xmlns:p="http://schemas.openxmlformats.org/presentationml/2006/main" type="blank" preserve="1">
   <p:cSld name="Blank Slide">
     <p:spTree>
       <p:nvGrpSpPr>
@@ -33,11 +128,14 @@
       </p:grpSpPr>
     </p:spTree>
   </p:cSld>
+  <p:clrMapOvr>
+    <a:masterClrMapping/>
+  </p:clrMapOvr>
 </p:sldLayout>
 </file>
 
 <file path=ppt/slideLayouts/slideLayout10.xml><?xml version="1.0" encoding="utf-8"?>
-<p:sldLayout xmlns:a="http://schemas.openxmlformats.org/drawingml/2006/main" xmlns:p="http://schemas.openxmlformats.org/presentationml/2006/main" xmlns:r="http://schemas.openxmlformats.org/officeDocument/2006/relationships" type="objOverTx" preserve="1">
+<p:sldLayout xmlns:a="http://schemas.openxmlformats.org/drawingml/2006/main" xmlns:r="http://schemas.openxmlformats.org/officeDocument/2006/relationships" xmlns:p="http://schemas.openxmlformats.org/presentationml/2006/main" type="objOverTx" preserve="1">
   <p:cSld name="Title, Content over Content">
     <p:spTree>
       <p:nvGrpSpPr>
@@ -73,7 +171,8 @@
           </a:prstGeom>
         </p:spPr>
         <p:txBody>
-          <a:bodyPr lIns="0" rIns="0" tIns="0" bIns="0" anchor="ctr"/>
+          <a:bodyPr lIns="0" tIns="0" rIns="0" bIns="0" anchor="ctr"/>
+          <a:lstStyle/>
           <a:p>
             <a:pPr algn="ctr"/>
             <a:endParaRPr/>
@@ -100,7 +199,8 @@
           </a:prstGeom>
         </p:spPr>
         <p:txBody>
-          <a:bodyPr lIns="0" rIns="0" tIns="0" bIns="0"/>
+          <a:bodyPr lIns="0" tIns="0" rIns="0" bIns="0"/>
+          <a:lstStyle/>
           <a:p>
             <a:endParaRPr/>
           </a:p>
@@ -126,7 +226,8 @@
           </a:prstGeom>
         </p:spPr>
         <p:txBody>
-          <a:bodyPr lIns="0" rIns="0" tIns="0" bIns="0"/>
+          <a:bodyPr lIns="0" tIns="0" rIns="0" bIns="0"/>
+          <a:lstStyle/>
           <a:p>
             <a:endParaRPr/>
           </a:p>
@@ -134,11 +235,14 @@
       </p:sp>
     </p:spTree>
   </p:cSld>
+  <p:clrMapOvr>
+    <a:masterClrMapping/>
+  </p:clrMapOvr>
 </p:sldLayout>
 </file>
 
 <file path=ppt/slideLayouts/slideLayout11.xml><?xml version="1.0" encoding="utf-8"?>
-<p:sldLayout xmlns:a="http://schemas.openxmlformats.org/drawingml/2006/main" xmlns:p="http://schemas.openxmlformats.org/presentationml/2006/main" xmlns:r="http://schemas.openxmlformats.org/officeDocument/2006/relationships" type="fourObj" preserve="1">
+<p:sldLayout xmlns:a="http://schemas.openxmlformats.org/drawingml/2006/main" xmlns:r="http://schemas.openxmlformats.org/officeDocument/2006/relationships" xmlns:p="http://schemas.openxmlformats.org/presentationml/2006/main" type="fourObj" preserve="1">
   <p:cSld name="Title, 4 Content">
     <p:spTree>
       <p:nvGrpSpPr>
@@ -174,7 +278,8 @@
           </a:prstGeom>
         </p:spPr>
         <p:txBody>
-          <a:bodyPr lIns="0" rIns="0" tIns="0" bIns="0" anchor="ctr"/>
+          <a:bodyPr lIns="0" tIns="0" rIns="0" bIns="0" anchor="ctr"/>
+          <a:lstStyle/>
           <a:p>
             <a:pPr algn="ctr"/>
             <a:endParaRPr/>
@@ -201,7 +306,8 @@
           </a:prstGeom>
         </p:spPr>
         <p:txBody>
-          <a:bodyPr lIns="0" rIns="0" tIns="0" bIns="0"/>
+          <a:bodyPr lIns="0" tIns="0" rIns="0" bIns="0"/>
+          <a:lstStyle/>
           <a:p>
             <a:endParaRPr/>
           </a:p>
@@ -227,7 +333,8 @@
           </a:prstGeom>
         </p:spPr>
         <p:txBody>
-          <a:bodyPr lIns="0" rIns="0" tIns="0" bIns="0"/>
+          <a:bodyPr lIns="0" tIns="0" rIns="0" bIns="0"/>
+          <a:lstStyle/>
           <a:p>
             <a:endParaRPr/>
           </a:p>
@@ -253,7 +360,8 @@
           </a:prstGeom>
         </p:spPr>
         <p:txBody>
-          <a:bodyPr lIns="0" rIns="0" tIns="0" bIns="0"/>
+          <a:bodyPr lIns="0" tIns="0" rIns="0" bIns="0"/>
+          <a:lstStyle/>
           <a:p>
             <a:endParaRPr/>
           </a:p>
@@ -279,7 +387,8 @@
           </a:prstGeom>
         </p:spPr>
         <p:txBody>
-          <a:bodyPr lIns="0" rIns="0" tIns="0" bIns="0"/>
+          <a:bodyPr lIns="0" tIns="0" rIns="0" bIns="0"/>
+          <a:lstStyle/>
           <a:p>
             <a:endParaRPr/>
           </a:p>
@@ -287,11 +396,14 @@
       </p:sp>
     </p:spTree>
   </p:cSld>
+  <p:clrMapOvr>
+    <a:masterClrMapping/>
+  </p:clrMapOvr>
 </p:sldLayout>
 </file>
 
 <file path=ppt/slideLayouts/slideLayout12.xml><?xml version="1.0" encoding="utf-8"?>
-<p:sldLayout xmlns:a="http://schemas.openxmlformats.org/drawingml/2006/main" xmlns:p="http://schemas.openxmlformats.org/presentationml/2006/main" xmlns:r="http://schemas.openxmlformats.org/officeDocument/2006/relationships" type="blank" preserve="1">
+<p:sldLayout xmlns:a="http://schemas.openxmlformats.org/drawingml/2006/main" xmlns:r="http://schemas.openxmlformats.org/officeDocument/2006/relationships" xmlns:p="http://schemas.openxmlformats.org/presentationml/2006/main" type="blank" preserve="1">
   <p:cSld name="Title, 6 Content">
     <p:spTree>
       <p:nvGrpSpPr>
@@ -327,7 +439,8 @@
           </a:prstGeom>
         </p:spPr>
         <p:txBody>
-          <a:bodyPr lIns="0" rIns="0" tIns="0" bIns="0" anchor="ctr"/>
+          <a:bodyPr lIns="0" tIns="0" rIns="0" bIns="0" anchor="ctr"/>
+          <a:lstStyle/>
           <a:p>
             <a:pPr algn="ctr"/>
             <a:endParaRPr/>
@@ -354,7 +467,8 @@
           </a:prstGeom>
         </p:spPr>
         <p:txBody>
-          <a:bodyPr lIns="0" rIns="0" tIns="0" bIns="0"/>
+          <a:bodyPr lIns="0" tIns="0" rIns="0" bIns="0"/>
+          <a:lstStyle/>
           <a:p>
             <a:endParaRPr/>
           </a:p>
@@ -380,7 +494,8 @@
           </a:prstGeom>
         </p:spPr>
         <p:txBody>
-          <a:bodyPr lIns="0" rIns="0" tIns="0" bIns="0"/>
+          <a:bodyPr lIns="0" tIns="0" rIns="0" bIns="0"/>
+          <a:lstStyle/>
           <a:p>
             <a:endParaRPr/>
           </a:p>
@@ -388,7 +503,7 @@
       </p:sp>
       <p:pic>
         <p:nvPicPr>
-          <p:cNvPr id="35" name="" descr=""/>
+          <p:cNvPr id="35" name="Picture 34"/>
           <p:cNvPicPr/>
           <p:nvPr/>
         </p:nvPicPr>
@@ -411,12 +526,12 @@
       </p:pic>
       <p:pic>
         <p:nvPicPr>
-          <p:cNvPr id="36" name="" descr=""/>
+          <p:cNvPr id="36" name="Picture 35"/>
           <p:cNvPicPr/>
           <p:nvPr/>
         </p:nvPicPr>
         <p:blipFill>
-          <a:blip r:embed="rId3"/>
+          <a:blip r:embed="rId2"/>
           <a:stretch/>
         </p:blipFill>
         <p:spPr>
@@ -434,11 +549,14 @@
       </p:pic>
     </p:spTree>
   </p:cSld>
+  <p:clrMapOvr>
+    <a:masterClrMapping/>
+  </p:clrMapOvr>
 </p:sldLayout>
 </file>
 
 <file path=ppt/slideLayouts/slideLayout2.xml><?xml version="1.0" encoding="utf-8"?>
-<p:sldLayout xmlns:a="http://schemas.openxmlformats.org/drawingml/2006/main" xmlns:p="http://schemas.openxmlformats.org/presentationml/2006/main" xmlns:r="http://schemas.openxmlformats.org/officeDocument/2006/relationships" type="tx" preserve="1">
+<p:sldLayout xmlns:a="http://schemas.openxmlformats.org/drawingml/2006/main" xmlns:r="http://schemas.openxmlformats.org/officeDocument/2006/relationships" xmlns:p="http://schemas.openxmlformats.org/presentationml/2006/main" type="tx" preserve="1">
   <p:cSld name="Title Slide">
     <p:spTree>
       <p:nvGrpSpPr>
@@ -474,7 +592,8 @@
           </a:prstGeom>
         </p:spPr>
         <p:txBody>
-          <a:bodyPr lIns="0" rIns="0" tIns="0" bIns="0" anchor="ctr"/>
+          <a:bodyPr lIns="0" tIns="0" rIns="0" bIns="0" anchor="ctr"/>
+          <a:lstStyle/>
           <a:p>
             <a:pPr algn="ctr"/>
             <a:endParaRPr/>
@@ -501,7 +620,8 @@
           </a:prstGeom>
         </p:spPr>
         <p:txBody>
-          <a:bodyPr lIns="0" rIns="0" tIns="0" bIns="0" anchor="ctr"/>
+          <a:bodyPr lIns="0" tIns="0" rIns="0" bIns="0" anchor="ctr"/>
+          <a:lstStyle/>
           <a:p>
             <a:pPr algn="ctr"/>
             <a:endParaRPr/>
@@ -510,11 +630,14 @@
       </p:sp>
     </p:spTree>
   </p:cSld>
+  <p:clrMapOvr>
+    <a:masterClrMapping/>
+  </p:clrMapOvr>
 </p:sldLayout>
 </file>
 
 <file path=ppt/slideLayouts/slideLayout3.xml><?xml version="1.0" encoding="utf-8"?>
-<p:sldLayout xmlns:a="http://schemas.openxmlformats.org/drawingml/2006/main" xmlns:p="http://schemas.openxmlformats.org/presentationml/2006/main" xmlns:r="http://schemas.openxmlformats.org/officeDocument/2006/relationships" type="obj" preserve="1">
+<p:sldLayout xmlns:a="http://schemas.openxmlformats.org/drawingml/2006/main" xmlns:r="http://schemas.openxmlformats.org/officeDocument/2006/relationships" xmlns:p="http://schemas.openxmlformats.org/presentationml/2006/main" type="obj" preserve="1">
   <p:cSld name="Title, Content">
     <p:spTree>
       <p:nvGrpSpPr>
@@ -550,7 +673,8 @@
           </a:prstGeom>
         </p:spPr>
         <p:txBody>
-          <a:bodyPr lIns="0" rIns="0" tIns="0" bIns="0" anchor="ctr"/>
+          <a:bodyPr lIns="0" tIns="0" rIns="0" bIns="0" anchor="ctr"/>
+          <a:lstStyle/>
           <a:p>
             <a:pPr algn="ctr"/>
             <a:endParaRPr/>
@@ -577,7 +701,8 @@
           </a:prstGeom>
         </p:spPr>
         <p:txBody>
-          <a:bodyPr lIns="0" rIns="0" tIns="0" bIns="0"/>
+          <a:bodyPr lIns="0" tIns="0" rIns="0" bIns="0"/>
+          <a:lstStyle/>
           <a:p>
             <a:endParaRPr/>
           </a:p>
@@ -585,11 +710,14 @@
       </p:sp>
     </p:spTree>
   </p:cSld>
+  <p:clrMapOvr>
+    <a:masterClrMapping/>
+  </p:clrMapOvr>
 </p:sldLayout>
 </file>
 
 <file path=ppt/slideLayouts/slideLayout4.xml><?xml version="1.0" encoding="utf-8"?>
-<p:sldLayout xmlns:a="http://schemas.openxmlformats.org/drawingml/2006/main" xmlns:p="http://schemas.openxmlformats.org/presentationml/2006/main" xmlns:r="http://schemas.openxmlformats.org/officeDocument/2006/relationships" type="twoObj" preserve="1">
+<p:sldLayout xmlns:a="http://schemas.openxmlformats.org/drawingml/2006/main" xmlns:r="http://schemas.openxmlformats.org/officeDocument/2006/relationships" xmlns:p="http://schemas.openxmlformats.org/presentationml/2006/main" type="twoObj" preserve="1">
   <p:cSld name="Title, 2 Content">
     <p:spTree>
       <p:nvGrpSpPr>
@@ -625,7 +753,8 @@
           </a:prstGeom>
         </p:spPr>
         <p:txBody>
-          <a:bodyPr lIns="0" rIns="0" tIns="0" bIns="0" anchor="ctr"/>
+          <a:bodyPr lIns="0" tIns="0" rIns="0" bIns="0" anchor="ctr"/>
+          <a:lstStyle/>
           <a:p>
             <a:pPr algn="ctr"/>
             <a:endParaRPr/>
@@ -652,7 +781,8 @@
           </a:prstGeom>
         </p:spPr>
         <p:txBody>
-          <a:bodyPr lIns="0" rIns="0" tIns="0" bIns="0"/>
+          <a:bodyPr lIns="0" tIns="0" rIns="0" bIns="0"/>
+          <a:lstStyle/>
           <a:p>
             <a:endParaRPr/>
           </a:p>
@@ -678,7 +808,8 @@
           </a:prstGeom>
         </p:spPr>
         <p:txBody>
-          <a:bodyPr lIns="0" rIns="0" tIns="0" bIns="0"/>
+          <a:bodyPr lIns="0" tIns="0" rIns="0" bIns="0"/>
+          <a:lstStyle/>
           <a:p>
             <a:endParaRPr/>
           </a:p>
@@ -686,11 +817,14 @@
       </p:sp>
     </p:spTree>
   </p:cSld>
+  <p:clrMapOvr>
+    <a:masterClrMapping/>
+  </p:clrMapOvr>
 </p:sldLayout>
 </file>
 
 <file path=ppt/slideLayouts/slideLayout5.xml><?xml version="1.0" encoding="utf-8"?>
-<p:sldLayout xmlns:a="http://schemas.openxmlformats.org/drawingml/2006/main" xmlns:p="http://schemas.openxmlformats.org/presentationml/2006/main" xmlns:r="http://schemas.openxmlformats.org/officeDocument/2006/relationships" type="titleOnly" preserve="1">
+<p:sldLayout xmlns:a="http://schemas.openxmlformats.org/drawingml/2006/main" xmlns:r="http://schemas.openxmlformats.org/officeDocument/2006/relationships" xmlns:p="http://schemas.openxmlformats.org/presentationml/2006/main" type="titleOnly" preserve="1">
   <p:cSld name="Title Only">
     <p:spTree>
       <p:nvGrpSpPr>
@@ -726,7 +860,8 @@
           </a:prstGeom>
         </p:spPr>
         <p:txBody>
-          <a:bodyPr lIns="0" rIns="0" tIns="0" bIns="0" anchor="ctr"/>
+          <a:bodyPr lIns="0" tIns="0" rIns="0" bIns="0" anchor="ctr"/>
+          <a:lstStyle/>
           <a:p>
             <a:pPr algn="ctr"/>
             <a:endParaRPr/>
@@ -735,11 +870,14 @@
       </p:sp>
     </p:spTree>
   </p:cSld>
+  <p:clrMapOvr>
+    <a:masterClrMapping/>
+  </p:clrMapOvr>
 </p:sldLayout>
 </file>
 
 <file path=ppt/slideLayouts/slideLayout6.xml><?xml version="1.0" encoding="utf-8"?>
-<p:sldLayout xmlns:a="http://schemas.openxmlformats.org/drawingml/2006/main" xmlns:p="http://schemas.openxmlformats.org/presentationml/2006/main" xmlns:r="http://schemas.openxmlformats.org/officeDocument/2006/relationships" type="objOnly" preserve="1">
+<p:sldLayout xmlns:a="http://schemas.openxmlformats.org/drawingml/2006/main" xmlns:r="http://schemas.openxmlformats.org/officeDocument/2006/relationships" xmlns:p="http://schemas.openxmlformats.org/presentationml/2006/main" type="objOnly" preserve="1">
   <p:cSld name="Centered Text">
     <p:spTree>
       <p:nvGrpSpPr>
@@ -775,7 +913,8 @@
           </a:prstGeom>
         </p:spPr>
         <p:txBody>
-          <a:bodyPr lIns="0" rIns="0" tIns="0" bIns="0" anchor="ctr"/>
+          <a:bodyPr lIns="0" tIns="0" rIns="0" bIns="0" anchor="ctr"/>
+          <a:lstStyle/>
           <a:p>
             <a:pPr algn="ctr"/>
             <a:endParaRPr/>
@@ -784,11 +923,14 @@
       </p:sp>
     </p:spTree>
   </p:cSld>
+  <p:clrMapOvr>
+    <a:masterClrMapping/>
+  </p:clrMapOvr>
 </p:sldLayout>
 </file>
 
 <file path=ppt/slideLayouts/slideLayout7.xml><?xml version="1.0" encoding="utf-8"?>
-<p:sldLayout xmlns:a="http://schemas.openxmlformats.org/drawingml/2006/main" xmlns:p="http://schemas.openxmlformats.org/presentationml/2006/main" xmlns:r="http://schemas.openxmlformats.org/officeDocument/2006/relationships" type="twoObjAndObj" preserve="1">
+<p:sldLayout xmlns:a="http://schemas.openxmlformats.org/drawingml/2006/main" xmlns:r="http://schemas.openxmlformats.org/officeDocument/2006/relationships" xmlns:p="http://schemas.openxmlformats.org/presentationml/2006/main" type="twoObjAndObj" preserve="1">
   <p:cSld name="Title, 2 Content and Content">
     <p:spTree>
       <p:nvGrpSpPr>
@@ -824,7 +966,8 @@
           </a:prstGeom>
         </p:spPr>
         <p:txBody>
-          <a:bodyPr lIns="0" rIns="0" tIns="0" bIns="0" anchor="ctr"/>
+          <a:bodyPr lIns="0" tIns="0" rIns="0" bIns="0" anchor="ctr"/>
+          <a:lstStyle/>
           <a:p>
             <a:pPr algn="ctr"/>
             <a:endParaRPr/>
@@ -851,7 +994,8 @@
           </a:prstGeom>
         </p:spPr>
         <p:txBody>
-          <a:bodyPr lIns="0" rIns="0" tIns="0" bIns="0"/>
+          <a:bodyPr lIns="0" tIns="0" rIns="0" bIns="0"/>
+          <a:lstStyle/>
           <a:p>
             <a:endParaRPr/>
           </a:p>
@@ -877,7 +1021,8 @@
           </a:prstGeom>
         </p:spPr>
         <p:txBody>
-          <a:bodyPr lIns="0" rIns="0" tIns="0" bIns="0"/>
+          <a:bodyPr lIns="0" tIns="0" rIns="0" bIns="0"/>
+          <a:lstStyle/>
           <a:p>
             <a:endParaRPr/>
           </a:p>
@@ -903,7 +1048,8 @@
           </a:prstGeom>
         </p:spPr>
         <p:txBody>
-          <a:bodyPr lIns="0" rIns="0" tIns="0" bIns="0"/>
+          <a:bodyPr lIns="0" tIns="0" rIns="0" bIns="0"/>
+          <a:lstStyle/>
           <a:p>
             <a:endParaRPr/>
           </a:p>
@@ -911,11 +1057,14 @@
       </p:sp>
     </p:spTree>
   </p:cSld>
+  <p:clrMapOvr>
+    <a:masterClrMapping/>
+  </p:clrMapOvr>
 </p:sldLayout>
 </file>
 
 <file path=ppt/slideLayouts/slideLayout8.xml><?xml version="1.0" encoding="utf-8"?>
-<p:sldLayout xmlns:a="http://schemas.openxmlformats.org/drawingml/2006/main" xmlns:p="http://schemas.openxmlformats.org/presentationml/2006/main" xmlns:r="http://schemas.openxmlformats.org/officeDocument/2006/relationships" type="objAndTwoObj" preserve="1">
+<p:sldLayout xmlns:a="http://schemas.openxmlformats.org/drawingml/2006/main" xmlns:r="http://schemas.openxmlformats.org/officeDocument/2006/relationships" xmlns:p="http://schemas.openxmlformats.org/presentationml/2006/main" type="objAndTwoObj" preserve="1">
   <p:cSld name="Title Content and 2 Content">
     <p:spTree>
       <p:nvGrpSpPr>
@@ -951,7 +1100,8 @@
           </a:prstGeom>
         </p:spPr>
         <p:txBody>
-          <a:bodyPr lIns="0" rIns="0" tIns="0" bIns="0" anchor="ctr"/>
+          <a:bodyPr lIns="0" tIns="0" rIns="0" bIns="0" anchor="ctr"/>
+          <a:lstStyle/>
           <a:p>
             <a:pPr algn="ctr"/>
             <a:endParaRPr/>
@@ -978,7 +1128,8 @@
           </a:prstGeom>
         </p:spPr>
         <p:txBody>
-          <a:bodyPr lIns="0" rIns="0" tIns="0" bIns="0"/>
+          <a:bodyPr lIns="0" tIns="0" rIns="0" bIns="0"/>
+          <a:lstStyle/>
           <a:p>
             <a:endParaRPr/>
           </a:p>
@@ -1004,7 +1155,8 @@
           </a:prstGeom>
         </p:spPr>
         <p:txBody>
-          <a:bodyPr lIns="0" rIns="0" tIns="0" bIns="0"/>
+          <a:bodyPr lIns="0" tIns="0" rIns="0" bIns="0"/>
+          <a:lstStyle/>
           <a:p>
             <a:endParaRPr/>
           </a:p>
@@ -1030,7 +1182,8 @@
           </a:prstGeom>
         </p:spPr>
         <p:txBody>
-          <a:bodyPr lIns="0" rIns="0" tIns="0" bIns="0"/>
+          <a:bodyPr lIns="0" tIns="0" rIns="0" bIns="0"/>
+          <a:lstStyle/>
           <a:p>
             <a:endParaRPr/>
           </a:p>
@@ -1038,11 +1191,14 @@
       </p:sp>
     </p:spTree>
   </p:cSld>
+  <p:clrMapOvr>
+    <a:masterClrMapping/>
+  </p:clrMapOvr>
 </p:sldLayout>
 </file>
 
 <file path=ppt/slideLayouts/slideLayout9.xml><?xml version="1.0" encoding="utf-8"?>
-<p:sldLayout xmlns:a="http://schemas.openxmlformats.org/drawingml/2006/main" xmlns:p="http://schemas.openxmlformats.org/presentationml/2006/main" xmlns:r="http://schemas.openxmlformats.org/officeDocument/2006/relationships" type="twoObjOverTx" preserve="1">
+<p:sldLayout xmlns:a="http://schemas.openxmlformats.org/drawingml/2006/main" xmlns:r="http://schemas.openxmlformats.org/officeDocument/2006/relationships" xmlns:p="http://schemas.openxmlformats.org/presentationml/2006/main" type="twoObjOverTx" preserve="1">
   <p:cSld name="Title, 2 Content over Content">
     <p:spTree>
       <p:nvGrpSpPr>
@@ -1078,7 +1234,8 @@
           </a:prstGeom>
         </p:spPr>
         <p:txBody>
-          <a:bodyPr lIns="0" rIns="0" tIns="0" bIns="0" anchor="ctr"/>
+          <a:bodyPr lIns="0" tIns="0" rIns="0" bIns="0" anchor="ctr"/>
+          <a:lstStyle/>
           <a:p>
             <a:pPr algn="ctr"/>
             <a:endParaRPr/>
@@ -1105,7 +1262,8 @@
           </a:prstGeom>
         </p:spPr>
         <p:txBody>
-          <a:bodyPr lIns="0" rIns="0" tIns="0" bIns="0"/>
+          <a:bodyPr lIns="0" tIns="0" rIns="0" bIns="0"/>
+          <a:lstStyle/>
           <a:p>
             <a:endParaRPr/>
           </a:p>
@@ -1131,7 +1289,8 @@
           </a:prstGeom>
         </p:spPr>
         <p:txBody>
-          <a:bodyPr lIns="0" rIns="0" tIns="0" bIns="0"/>
+          <a:bodyPr lIns="0" tIns="0" rIns="0" bIns="0"/>
+          <a:lstStyle/>
           <a:p>
             <a:endParaRPr/>
           </a:p>
@@ -1157,7 +1316,8 @@
           </a:prstGeom>
         </p:spPr>
         <p:txBody>
-          <a:bodyPr lIns="0" rIns="0" tIns="0" bIns="0"/>
+          <a:bodyPr lIns="0" tIns="0" rIns="0" bIns="0"/>
+          <a:lstStyle/>
           <a:p>
             <a:endParaRPr/>
           </a:p>
@@ -1165,20 +1325,27 @@
       </p:sp>
     </p:spTree>
   </p:cSld>
+  <p:clrMapOvr>
+    <a:masterClrMapping/>
+  </p:clrMapOvr>
 </p:sldLayout>
 </file>
 
 <file path=ppt/slideMasters/slideMaster1.xml><?xml version="1.0" encoding="utf-8"?>
-<p:sldMaster xmlns:a="http://schemas.openxmlformats.org/drawingml/2006/main" xmlns:p="http://schemas.openxmlformats.org/presentationml/2006/main" xmlns:r="http://schemas.openxmlformats.org/officeDocument/2006/relationships">
+<p:sldMaster xmlns:a="http://schemas.openxmlformats.org/drawingml/2006/main" xmlns:r="http://schemas.openxmlformats.org/officeDocument/2006/relationships" xmlns:p="http://schemas.openxmlformats.org/presentationml/2006/main">
   <p:cSld>
     <p:bg>
       <p:bgPr>
-        <a:blipFill>
-          <a:blip r:embed="rId2"/>
+        <a:blipFill dpi="0" rotWithShape="1">
+          <a:blip r:embed="rId14">
+            <a:lum/>
+          </a:blip>
+          <a:srcRect/>
           <a:stretch>
             <a:fillRect/>
           </a:stretch>
         </a:blipFill>
+        <a:effectLst/>
       </p:bgPr>
     </p:bg>
     <p:spTree>
@@ -1197,7 +1364,7 @@
       </p:grpSpPr>
       <p:sp>
         <p:nvSpPr>
-          <p:cNvPr id="0" name="PlaceHolder 1"/>
+          <p:cNvPr id="2" name="Title Placeholder 1"/>
           <p:cNvSpPr>
             <a:spLocks noGrp="1"/>
           </p:cNvSpPr>
@@ -1207,212 +1374,510 @@
         </p:nvSpPr>
         <p:spPr>
           <a:xfrm>
-            <a:off x="504000" y="301320"/>
-            <a:ext cx="9071280" cy="1261800"/>
-          </a:xfrm>
-          <a:prstGeom prst="rect">
-            <a:avLst/>
-          </a:prstGeom>
-        </p:spPr>
-        <p:txBody>
-          <a:bodyPr lIns="0" rIns="0" tIns="0" bIns="0" anchor="ctr"/>
-          <a:p>
-            <a:pPr algn="ctr"/>
-            <a:endParaRPr/>
-          </a:p>
-        </p:txBody>
-      </p:sp>
-      <p:sp>
-        <p:nvSpPr>
-          <p:cNvPr id="1" name="PlaceHolder 2"/>
-          <p:cNvSpPr>
-            <a:spLocks noGrp="1"/>
-          </p:cNvSpPr>
-          <p:nvPr>
-            <p:ph type="subTitle"/>
-          </p:nvPr>
-        </p:nvSpPr>
-        <p:spPr>
-          <a:xfrm>
-            <a:off x="504000" y="1769040"/>
-            <a:ext cx="9071280" cy="4384080"/>
-          </a:xfrm>
-          <a:prstGeom prst="rect">
-            <a:avLst/>
-          </a:prstGeom>
-        </p:spPr>
-        <p:txBody>
-          <a:bodyPr lIns="0" rIns="0" tIns="0" bIns="0" anchor="ctr"/>
-          <a:p>
-            <a:pPr algn="ctr"/>
-            <a:endParaRPr/>
-          </a:p>
-        </p:txBody>
-      </p:sp>
-      <p:sp>
-        <p:nvSpPr>
-          <p:cNvPr id="2" name="PlaceHolder 3"/>
-          <p:cNvSpPr>
-            <a:spLocks noGrp="1"/>
-          </p:cNvSpPr>
-          <p:nvPr>
-            <p:ph type="body"/>
-          </p:nvPr>
-        </p:nvSpPr>
-        <p:spPr>
-          <a:xfrm>
-            <a:off x="504000" y="1768680"/>
-            <a:ext cx="9072000" cy="4384080"/>
-          </a:xfrm>
-          <a:prstGeom prst="rect">
-            <a:avLst/>
-          </a:prstGeom>
-        </p:spPr>
-        <p:txBody>
-          <a:bodyPr lIns="0" rIns="0" tIns="0" bIns="0"/>
-          <a:p>
-            <a:pPr marL="432000" indent="-324000">
-              <a:buClr>
-                <a:srgbClr val="ffffff"/>
-              </a:buClr>
-              <a:buSzPct val="45000"/>
-              <a:buFont typeface="Wingdings" charset="2"/>
-              <a:buChar char=""/>
-            </a:pPr>
+            <a:off x="693738" y="403225"/>
+            <a:ext cx="8693150" cy="1460500"/>
+          </a:xfrm>
+          <a:prstGeom prst="rect">
+            <a:avLst/>
+          </a:prstGeom>
+        </p:spPr>
+        <p:txBody>
+          <a:bodyPr vert="horz" lIns="91440" tIns="45720" rIns="91440" bIns="45720" rtlCol="0" anchor="ctr">
+            <a:normAutofit/>
+          </a:bodyPr>
+          <a:lstStyle/>
+          <a:p>
             <a:r>
-              <a:rPr lang="en-US" sz="3200" spc="-1">
-                <a:latin typeface="Arial"/>
-              </a:rPr>
-              <a:t>Click to edit the outline text format</a:t>
+              <a:rPr lang="en-US" smtClean="0"/>
+              <a:t>Click to edit Master title style</a:t>
             </a:r>
-            <a:endParaRPr/>
-          </a:p>
-          <a:p>
-            <a:pPr lvl="1" marL="864000" indent="-324000">
-              <a:buClr>
-                <a:srgbClr val="ffffff"/>
-              </a:buClr>
-              <a:buSzPct val="75000"/>
-              <a:buFont typeface="Symbol" charset="2"/>
-              <a:buChar char=""/>
-            </a:pPr>
+            <a:endParaRPr lang="en-US"/>
+          </a:p>
+        </p:txBody>
+      </p:sp>
+      <p:sp>
+        <p:nvSpPr>
+          <p:cNvPr id="3" name="Text Placeholder 2"/>
+          <p:cNvSpPr>
+            <a:spLocks noGrp="1"/>
+          </p:cNvSpPr>
+          <p:nvPr>
+            <p:ph type="body" idx="1"/>
+          </p:nvPr>
+        </p:nvSpPr>
+        <p:spPr>
+          <a:xfrm>
+            <a:off x="693738" y="2012950"/>
+            <a:ext cx="8693150" cy="4795838"/>
+          </a:xfrm>
+          <a:prstGeom prst="rect">
+            <a:avLst/>
+          </a:prstGeom>
+        </p:spPr>
+        <p:txBody>
+          <a:bodyPr vert="horz" lIns="91440" tIns="45720" rIns="91440" bIns="45720" rtlCol="0">
+            <a:normAutofit/>
+          </a:bodyPr>
+          <a:lstStyle/>
+          <a:p>
+            <a:pPr lvl="0"/>
             <a:r>
-              <a:rPr lang="en-US" sz="2800" spc="-1">
-                <a:latin typeface="Arial"/>
-              </a:rPr>
-              <a:t>Second Outline Level</a:t>
+              <a:rPr lang="en-US" smtClean="0"/>
+              <a:t>Click to edit Master text styles</a:t>
             </a:r>
-            <a:endParaRPr/>
-          </a:p>
-          <a:p>
-            <a:pPr lvl="2" marL="1296000" indent="-288000">
-              <a:buClr>
-                <a:srgbClr val="ffffff"/>
-              </a:buClr>
-              <a:buSzPct val="45000"/>
-              <a:buFont typeface="Wingdings" charset="2"/>
-              <a:buChar char=""/>
-            </a:pPr>
+          </a:p>
+          <a:p>
+            <a:pPr lvl="1"/>
             <a:r>
-              <a:rPr lang="en-US" sz="2400" spc="-1">
-                <a:latin typeface="Arial"/>
-              </a:rPr>
-              <a:t>Third Outline Level</a:t>
+              <a:rPr lang="en-US" smtClean="0"/>
+              <a:t>Second level</a:t>
             </a:r>
-            <a:endParaRPr/>
-          </a:p>
-          <a:p>
-            <a:pPr lvl="3" marL="1728000" indent="-216000">
-              <a:buClr>
-                <a:srgbClr val="ffffff"/>
-              </a:buClr>
-              <a:buSzPct val="75000"/>
-              <a:buFont typeface="Symbol" charset="2"/>
-              <a:buChar char=""/>
-            </a:pPr>
+          </a:p>
+          <a:p>
+            <a:pPr lvl="2"/>
             <a:r>
-              <a:rPr lang="en-US" sz="2000" spc="-1">
-                <a:latin typeface="Arial"/>
-              </a:rPr>
-              <a:t>Fourth Outline Level</a:t>
+              <a:rPr lang="en-US" smtClean="0"/>
+              <a:t>Third level</a:t>
             </a:r>
-            <a:endParaRPr/>
-          </a:p>
-          <a:p>
-            <a:pPr lvl="4" marL="2160000" indent="-216000">
-              <a:buClr>
-                <a:srgbClr val="ffffff"/>
-              </a:buClr>
-              <a:buSzPct val="45000"/>
-              <a:buFont typeface="Wingdings" charset="2"/>
-              <a:buChar char=""/>
-            </a:pPr>
+          </a:p>
+          <a:p>
+            <a:pPr lvl="3"/>
             <a:r>
-              <a:rPr lang="en-US" sz="2000" spc="-1">
-                <a:latin typeface="Arial"/>
-              </a:rPr>
-              <a:t>Fifth Outline Level</a:t>
+              <a:rPr lang="en-US" smtClean="0"/>
+              <a:t>Fourth level</a:t>
             </a:r>
-            <a:endParaRPr/>
-          </a:p>
-          <a:p>
-            <a:pPr lvl="5" marL="2592000" indent="-216000">
-              <a:buClr>
-                <a:srgbClr val="ffffff"/>
-              </a:buClr>
-              <a:buSzPct val="45000"/>
-              <a:buFont typeface="Wingdings" charset="2"/>
-              <a:buChar char=""/>
-            </a:pPr>
+          </a:p>
+          <a:p>
+            <a:pPr lvl="4"/>
             <a:r>
-              <a:rPr lang="en-US" sz="2000" spc="-1">
-                <a:latin typeface="Arial"/>
-              </a:rPr>
-              <a:t>Sixth Outline Level</a:t>
+              <a:rPr lang="en-US" smtClean="0"/>
+              <a:t>Fifth level</a:t>
             </a:r>
-            <a:endParaRPr/>
-          </a:p>
-          <a:p>
-            <a:pPr lvl="6" marL="3024000" indent="-216000">
-              <a:buClr>
-                <a:srgbClr val="ffffff"/>
-              </a:buClr>
-              <a:buSzPct val="45000"/>
-              <a:buFont typeface="Wingdings" charset="2"/>
-              <a:buChar char=""/>
-            </a:pPr>
-            <a:r>
-              <a:rPr lang="en-US" sz="2000" spc="-1">
-                <a:latin typeface="Arial"/>
-              </a:rPr>
-              <a:t>Seventh Outline Level</a:t>
-            </a:r>
-            <a:endParaRPr/>
+            <a:endParaRPr lang="en-US"/>
+          </a:p>
+        </p:txBody>
+      </p:sp>
+      <p:sp>
+        <p:nvSpPr>
+          <p:cNvPr id="4" name="Date Placeholder 3"/>
+          <p:cNvSpPr>
+            <a:spLocks noGrp="1"/>
+          </p:cNvSpPr>
+          <p:nvPr>
+            <p:ph type="dt" sz="half" idx="2"/>
+          </p:nvPr>
+        </p:nvSpPr>
+        <p:spPr>
+          <a:xfrm>
+            <a:off x="693738" y="7007225"/>
+            <a:ext cx="2266950" cy="401638"/>
+          </a:xfrm>
+          <a:prstGeom prst="rect">
+            <a:avLst/>
+          </a:prstGeom>
+        </p:spPr>
+        <p:txBody>
+          <a:bodyPr vert="horz" lIns="91440" tIns="45720" rIns="91440" bIns="45720" rtlCol="0" anchor="ctr"/>
+          <a:lstStyle>
+            <a:lvl1pPr algn="l">
+              <a:defRPr sz="1200">
+                <a:solidFill>
+                  <a:schemeClr val="tx1">
+                    <a:tint val="75000"/>
+                  </a:schemeClr>
+                </a:solidFill>
+              </a:defRPr>
+            </a:lvl1pPr>
+          </a:lstStyle>
+          <a:p>
+            <a:fld id="{52A2EB85-3E59-4955-BB89-CD75048086B8}" type="datetimeFigureOut">
+              <a:rPr lang="en-US" smtClean="0"/>
+              <a:t>5/2/2016</a:t>
+            </a:fld>
+            <a:endParaRPr lang="en-US"/>
+          </a:p>
+        </p:txBody>
+      </p:sp>
+      <p:sp>
+        <p:nvSpPr>
+          <p:cNvPr id="5" name="Footer Placeholder 4"/>
+          <p:cNvSpPr>
+            <a:spLocks noGrp="1"/>
+          </p:cNvSpPr>
+          <p:nvPr>
+            <p:ph type="ftr" sz="quarter" idx="3"/>
+          </p:nvPr>
+        </p:nvSpPr>
+        <p:spPr>
+          <a:xfrm>
+            <a:off x="3338513" y="7007225"/>
+            <a:ext cx="3403600" cy="401638"/>
+          </a:xfrm>
+          <a:prstGeom prst="rect">
+            <a:avLst/>
+          </a:prstGeom>
+        </p:spPr>
+        <p:txBody>
+          <a:bodyPr vert="horz" lIns="91440" tIns="45720" rIns="91440" bIns="45720" rtlCol="0" anchor="ctr"/>
+          <a:lstStyle>
+            <a:lvl1pPr algn="ctr">
+              <a:defRPr sz="1200">
+                <a:solidFill>
+                  <a:schemeClr val="tx1">
+                    <a:tint val="75000"/>
+                  </a:schemeClr>
+                </a:solidFill>
+              </a:defRPr>
+            </a:lvl1pPr>
+          </a:lstStyle>
+          <a:p>
+            <a:endParaRPr lang="en-US"/>
+          </a:p>
+        </p:txBody>
+      </p:sp>
+      <p:sp>
+        <p:nvSpPr>
+          <p:cNvPr id="6" name="Slide Number Placeholder 5"/>
+          <p:cNvSpPr>
+            <a:spLocks noGrp="1"/>
+          </p:cNvSpPr>
+          <p:nvPr>
+            <p:ph type="sldNum" sz="quarter" idx="4"/>
+          </p:nvPr>
+        </p:nvSpPr>
+        <p:spPr>
+          <a:xfrm>
+            <a:off x="7119938" y="7007225"/>
+            <a:ext cx="2266950" cy="401638"/>
+          </a:xfrm>
+          <a:prstGeom prst="rect">
+            <a:avLst/>
+          </a:prstGeom>
+        </p:spPr>
+        <p:txBody>
+          <a:bodyPr vert="horz" lIns="91440" tIns="45720" rIns="91440" bIns="45720" rtlCol="0" anchor="ctr"/>
+          <a:lstStyle>
+            <a:lvl1pPr algn="r">
+              <a:defRPr sz="1200">
+                <a:solidFill>
+                  <a:schemeClr val="tx1">
+                    <a:tint val="75000"/>
+                  </a:schemeClr>
+                </a:solidFill>
+              </a:defRPr>
+            </a:lvl1pPr>
+          </a:lstStyle>
+          <a:p>
+            <a:fld id="{FE67BB34-9179-4D8A-ADB4-A1065A5CD859}" type="slidenum">
+              <a:rPr lang="en-US" smtClean="0"/>
+              <a:t>‹#›</a:t>
+            </a:fld>
+            <a:endParaRPr lang="en-US"/>
           </a:p>
         </p:txBody>
       </p:sp>
     </p:spTree>
   </p:cSld>
-  <p:clrMap bg1="lt1" bg2="lt2" tx1="dk1" tx2="dk2" accent1="accent1" accent2="accent2" accent3="accent3" accent4="accent4" accent5="accent5" accent6="accent6" hlink="hlink" folHlink="folHlink"/>
+  <p:clrMap bg1="lt1" tx1="dk1" bg2="lt2" tx2="dk2" accent1="accent1" accent2="accent2" accent3="accent3" accent4="accent4" accent5="accent5" accent6="accent6" hlink="hlink" folHlink="folHlink"/>
   <p:sldLayoutIdLst>
-    <p:sldLayoutId id="2147483649" r:id="rId3"/>
-    <p:sldLayoutId id="2147483650" r:id="rId4"/>
-    <p:sldLayoutId id="2147483651" r:id="rId5"/>
-    <p:sldLayoutId id="2147483652" r:id="rId6"/>
-    <p:sldLayoutId id="2147483653" r:id="rId7"/>
-    <p:sldLayoutId id="2147483654" r:id="rId8"/>
-    <p:sldLayoutId id="2147483655" r:id="rId9"/>
-    <p:sldLayoutId id="2147483656" r:id="rId10"/>
-    <p:sldLayoutId id="2147483657" r:id="rId11"/>
-    <p:sldLayoutId id="2147483658" r:id="rId12"/>
-    <p:sldLayoutId id="2147483659" r:id="rId13"/>
-    <p:sldLayoutId id="2147483660" r:id="rId14"/>
+    <p:sldLayoutId id="2147483649" r:id="rId1"/>
+    <p:sldLayoutId id="2147483650" r:id="rId2"/>
+    <p:sldLayoutId id="2147483651" r:id="rId3"/>
+    <p:sldLayoutId id="2147483652" r:id="rId4"/>
+    <p:sldLayoutId id="2147483653" r:id="rId5"/>
+    <p:sldLayoutId id="2147483654" r:id="rId6"/>
+    <p:sldLayoutId id="2147483655" r:id="rId7"/>
+    <p:sldLayoutId id="2147483656" r:id="rId8"/>
+    <p:sldLayoutId id="2147483657" r:id="rId9"/>
+    <p:sldLayoutId id="2147483658" r:id="rId10"/>
+    <p:sldLayoutId id="2147483659" r:id="rId11"/>
+    <p:sldLayoutId id="2147483660" r:id="rId12"/>
   </p:sldLayoutIdLst>
+  <p:txStyles>
+    <p:titleStyle>
+      <a:lvl1pPr algn="l" defTabSz="914400" rtl="0" eaLnBrk="1" latinLnBrk="0" hangingPunct="1">
+        <a:lnSpc>
+          <a:spcPct val="90000"/>
+        </a:lnSpc>
+        <a:spcBef>
+          <a:spcPct val="0"/>
+        </a:spcBef>
+        <a:buNone/>
+        <a:defRPr sz="4400" kern="1200">
+          <a:solidFill>
+            <a:schemeClr val="tx1"/>
+          </a:solidFill>
+          <a:latin typeface="+mj-lt"/>
+          <a:ea typeface="+mj-ea"/>
+          <a:cs typeface="+mj-cs"/>
+        </a:defRPr>
+      </a:lvl1pPr>
+    </p:titleStyle>
+    <p:bodyStyle>
+      <a:lvl1pPr marL="228600" indent="-228600" algn="l" defTabSz="914400" rtl="0" eaLnBrk="1" latinLnBrk="0" hangingPunct="1">
+        <a:lnSpc>
+          <a:spcPct val="90000"/>
+        </a:lnSpc>
+        <a:spcBef>
+          <a:spcPts val="1000"/>
+        </a:spcBef>
+        <a:buFont typeface="Arial" panose="020B0604020202020204" pitchFamily="34" charset="0"/>
+        <a:buChar char="•"/>
+        <a:defRPr sz="2800" kern="1200">
+          <a:solidFill>
+            <a:schemeClr val="tx1"/>
+          </a:solidFill>
+          <a:latin typeface="+mn-lt"/>
+          <a:ea typeface="+mn-ea"/>
+          <a:cs typeface="+mn-cs"/>
+        </a:defRPr>
+      </a:lvl1pPr>
+      <a:lvl2pPr marL="685800" indent="-228600" algn="l" defTabSz="914400" rtl="0" eaLnBrk="1" latinLnBrk="0" hangingPunct="1">
+        <a:lnSpc>
+          <a:spcPct val="90000"/>
+        </a:lnSpc>
+        <a:spcBef>
+          <a:spcPts val="500"/>
+        </a:spcBef>
+        <a:buFont typeface="Arial" panose="020B0604020202020204" pitchFamily="34" charset="0"/>
+        <a:buChar char="•"/>
+        <a:defRPr sz="2400" kern="1200">
+          <a:solidFill>
+            <a:schemeClr val="tx1"/>
+          </a:solidFill>
+          <a:latin typeface="+mn-lt"/>
+          <a:ea typeface="+mn-ea"/>
+          <a:cs typeface="+mn-cs"/>
+        </a:defRPr>
+      </a:lvl2pPr>
+      <a:lvl3pPr marL="1143000" indent="-228600" algn="l" defTabSz="914400" rtl="0" eaLnBrk="1" latinLnBrk="0" hangingPunct="1">
+        <a:lnSpc>
+          <a:spcPct val="90000"/>
+        </a:lnSpc>
+        <a:spcBef>
+          <a:spcPts val="500"/>
+        </a:spcBef>
+        <a:buFont typeface="Arial" panose="020B0604020202020204" pitchFamily="34" charset="0"/>
+        <a:buChar char="•"/>
+        <a:defRPr sz="2000" kern="1200">
+          <a:solidFill>
+            <a:schemeClr val="tx1"/>
+          </a:solidFill>
+          <a:latin typeface="+mn-lt"/>
+          <a:ea typeface="+mn-ea"/>
+          <a:cs typeface="+mn-cs"/>
+        </a:defRPr>
+      </a:lvl3pPr>
+      <a:lvl4pPr marL="1600200" indent="-228600" algn="l" defTabSz="914400" rtl="0" eaLnBrk="1" latinLnBrk="0" hangingPunct="1">
+        <a:lnSpc>
+          <a:spcPct val="90000"/>
+        </a:lnSpc>
+        <a:spcBef>
+          <a:spcPts val="500"/>
+        </a:spcBef>
+        <a:buFont typeface="Arial" panose="020B0604020202020204" pitchFamily="34" charset="0"/>
+        <a:buChar char="•"/>
+        <a:defRPr sz="1800" kern="1200">
+          <a:solidFill>
+            <a:schemeClr val="tx1"/>
+          </a:solidFill>
+          <a:latin typeface="+mn-lt"/>
+          <a:ea typeface="+mn-ea"/>
+          <a:cs typeface="+mn-cs"/>
+        </a:defRPr>
+      </a:lvl4pPr>
+      <a:lvl5pPr marL="2057400" indent="-228600" algn="l" defTabSz="914400" rtl="0" eaLnBrk="1" latinLnBrk="0" hangingPunct="1">
+        <a:lnSpc>
+          <a:spcPct val="90000"/>
+        </a:lnSpc>
+        <a:spcBef>
+          <a:spcPts val="500"/>
+        </a:spcBef>
+        <a:buFont typeface="Arial" panose="020B0604020202020204" pitchFamily="34" charset="0"/>
+        <a:buChar char="•"/>
+        <a:defRPr sz="1800" kern="1200">
+          <a:solidFill>
+            <a:schemeClr val="tx1"/>
+          </a:solidFill>
+          <a:latin typeface="+mn-lt"/>
+          <a:ea typeface="+mn-ea"/>
+          <a:cs typeface="+mn-cs"/>
+        </a:defRPr>
+      </a:lvl5pPr>
+      <a:lvl6pPr marL="2514600" indent="-228600" algn="l" defTabSz="914400" rtl="0" eaLnBrk="1" latinLnBrk="0" hangingPunct="1">
+        <a:lnSpc>
+          <a:spcPct val="90000"/>
+        </a:lnSpc>
+        <a:spcBef>
+          <a:spcPts val="500"/>
+        </a:spcBef>
+        <a:buFont typeface="Arial" panose="020B0604020202020204" pitchFamily="34" charset="0"/>
+        <a:buChar char="•"/>
+        <a:defRPr sz="1800" kern="1200">
+          <a:solidFill>
+            <a:schemeClr val="tx1"/>
+          </a:solidFill>
+          <a:latin typeface="+mn-lt"/>
+          <a:ea typeface="+mn-ea"/>
+          <a:cs typeface="+mn-cs"/>
+        </a:defRPr>
+      </a:lvl6pPr>
+      <a:lvl7pPr marL="2971800" indent="-228600" algn="l" defTabSz="914400" rtl="0" eaLnBrk="1" latinLnBrk="0" hangingPunct="1">
+        <a:lnSpc>
+          <a:spcPct val="90000"/>
+        </a:lnSpc>
+        <a:spcBef>
+          <a:spcPts val="500"/>
+        </a:spcBef>
+        <a:buFont typeface="Arial" panose="020B0604020202020204" pitchFamily="34" charset="0"/>
+        <a:buChar char="•"/>
+        <a:defRPr sz="1800" kern="1200">
+          <a:solidFill>
+            <a:schemeClr val="tx1"/>
+          </a:solidFill>
+          <a:latin typeface="+mn-lt"/>
+          <a:ea typeface="+mn-ea"/>
+          <a:cs typeface="+mn-cs"/>
+        </a:defRPr>
+      </a:lvl7pPr>
+      <a:lvl8pPr marL="3429000" indent="-228600" algn="l" defTabSz="914400" rtl="0" eaLnBrk="1" latinLnBrk="0" hangingPunct="1">
+        <a:lnSpc>
+          <a:spcPct val="90000"/>
+        </a:lnSpc>
+        <a:spcBef>
+          <a:spcPts val="500"/>
+        </a:spcBef>
+        <a:buFont typeface="Arial" panose="020B0604020202020204" pitchFamily="34" charset="0"/>
+        <a:buChar char="•"/>
+        <a:defRPr sz="1800" kern="1200">
+          <a:solidFill>
+            <a:schemeClr val="tx1"/>
+          </a:solidFill>
+          <a:latin typeface="+mn-lt"/>
+          <a:ea typeface="+mn-ea"/>
+          <a:cs typeface="+mn-cs"/>
+        </a:defRPr>
+      </a:lvl8pPr>
+      <a:lvl9pPr marL="3886200" indent="-228600" algn="l" defTabSz="914400" rtl="0" eaLnBrk="1" latinLnBrk="0" hangingPunct="1">
+        <a:lnSpc>
+          <a:spcPct val="90000"/>
+        </a:lnSpc>
+        <a:spcBef>
+          <a:spcPts val="500"/>
+        </a:spcBef>
+        <a:buFont typeface="Arial" panose="020B0604020202020204" pitchFamily="34" charset="0"/>
+        <a:buChar char="•"/>
+        <a:defRPr sz="1800" kern="1200">
+          <a:solidFill>
+            <a:schemeClr val="tx1"/>
+          </a:solidFill>
+          <a:latin typeface="+mn-lt"/>
+          <a:ea typeface="+mn-ea"/>
+          <a:cs typeface="+mn-cs"/>
+        </a:defRPr>
+      </a:lvl9pPr>
+    </p:bodyStyle>
+    <p:otherStyle>
+      <a:defPPr>
+        <a:defRPr lang="en-US"/>
+      </a:defPPr>
+      <a:lvl1pPr marL="0" algn="l" defTabSz="914400" rtl="0" eaLnBrk="1" latinLnBrk="0" hangingPunct="1">
+        <a:defRPr sz="1800" kern="1200">
+          <a:solidFill>
+            <a:schemeClr val="tx1"/>
+          </a:solidFill>
+          <a:latin typeface="+mn-lt"/>
+          <a:ea typeface="+mn-ea"/>
+          <a:cs typeface="+mn-cs"/>
+        </a:defRPr>
+      </a:lvl1pPr>
+      <a:lvl2pPr marL="457200" algn="l" defTabSz="914400" rtl="0" eaLnBrk="1" latinLnBrk="0" hangingPunct="1">
+        <a:defRPr sz="1800" kern="1200">
+          <a:solidFill>
+            <a:schemeClr val="tx1"/>
+          </a:solidFill>
+          <a:latin typeface="+mn-lt"/>
+          <a:ea typeface="+mn-ea"/>
+          <a:cs typeface="+mn-cs"/>
+        </a:defRPr>
+      </a:lvl2pPr>
+      <a:lvl3pPr marL="914400" algn="l" defTabSz="914400" rtl="0" eaLnBrk="1" latinLnBrk="0" hangingPunct="1">
+        <a:defRPr sz="1800" kern="1200">
+          <a:solidFill>
+            <a:schemeClr val="tx1"/>
+          </a:solidFill>
+          <a:latin typeface="+mn-lt"/>
+          <a:ea typeface="+mn-ea"/>
+          <a:cs typeface="+mn-cs"/>
+        </a:defRPr>
+      </a:lvl3pPr>
+      <a:lvl4pPr marL="1371600" algn="l" defTabSz="914400" rtl="0" eaLnBrk="1" latinLnBrk="0" hangingPunct="1">
+        <a:defRPr sz="1800" kern="1200">
+          <a:solidFill>
+            <a:schemeClr val="tx1"/>
+          </a:solidFill>
+          <a:latin typeface="+mn-lt"/>
+          <a:ea typeface="+mn-ea"/>
+          <a:cs typeface="+mn-cs"/>
+        </a:defRPr>
+      </a:lvl4pPr>
+      <a:lvl5pPr marL="1828800" algn="l" defTabSz="914400" rtl="0" eaLnBrk="1" latinLnBrk="0" hangingPunct="1">
+        <a:defRPr sz="1800" kern="1200">
+          <a:solidFill>
+            <a:schemeClr val="tx1"/>
+          </a:solidFill>
+          <a:latin typeface="+mn-lt"/>
+          <a:ea typeface="+mn-ea"/>
+          <a:cs typeface="+mn-cs"/>
+        </a:defRPr>
+      </a:lvl5pPr>
+      <a:lvl6pPr marL="2286000" algn="l" defTabSz="914400" rtl="0" eaLnBrk="1" latinLnBrk="0" hangingPunct="1">
+        <a:defRPr sz="1800" kern="1200">
+          <a:solidFill>
+            <a:schemeClr val="tx1"/>
+          </a:solidFill>
+          <a:latin typeface="+mn-lt"/>
+          <a:ea typeface="+mn-ea"/>
+          <a:cs typeface="+mn-cs"/>
+        </a:defRPr>
+      </a:lvl6pPr>
+      <a:lvl7pPr marL="2743200" algn="l" defTabSz="914400" rtl="0" eaLnBrk="1" latinLnBrk="0" hangingPunct="1">
+        <a:defRPr sz="1800" kern="1200">
+          <a:solidFill>
+            <a:schemeClr val="tx1"/>
+          </a:solidFill>
+          <a:latin typeface="+mn-lt"/>
+          <a:ea typeface="+mn-ea"/>
+          <a:cs typeface="+mn-cs"/>
+        </a:defRPr>
+      </a:lvl7pPr>
+      <a:lvl8pPr marL="3200400" algn="l" defTabSz="914400" rtl="0" eaLnBrk="1" latinLnBrk="0" hangingPunct="1">
+        <a:defRPr sz="1800" kern="1200">
+          <a:solidFill>
+            <a:schemeClr val="tx1"/>
+          </a:solidFill>
+          <a:latin typeface="+mn-lt"/>
+          <a:ea typeface="+mn-ea"/>
+          <a:cs typeface="+mn-cs"/>
+        </a:defRPr>
+      </a:lvl8pPr>
+      <a:lvl9pPr marL="3657600" algn="l" defTabSz="914400" rtl="0" eaLnBrk="1" latinLnBrk="0" hangingPunct="1">
+        <a:defRPr sz="1800" kern="1200">
+          <a:solidFill>
+            <a:schemeClr val="tx1"/>
+          </a:solidFill>
+          <a:latin typeface="+mn-lt"/>
+          <a:ea typeface="+mn-ea"/>
+          <a:cs typeface="+mn-cs"/>
+        </a:defRPr>
+      </a:lvl9pPr>
+    </p:otherStyle>
+  </p:txStyles>
 </p:sldMaster>
 </file>
 
 <file path=ppt/slides/slide1.xml><?xml version="1.0" encoding="utf-8"?>
-<p:sld xmlns:a="http://schemas.openxmlformats.org/drawingml/2006/main" xmlns:p="http://schemas.openxmlformats.org/presentationml/2006/main" xmlns:r="http://schemas.openxmlformats.org/officeDocument/2006/relationships">
+<p:sld xmlns:a="http://schemas.openxmlformats.org/drawingml/2006/main" xmlns:r="http://schemas.openxmlformats.org/officeDocument/2006/relationships" xmlns:p="http://schemas.openxmlformats.org/presentationml/2006/main">
   <p:cSld>
     <p:spTree>
       <p:nvGrpSpPr>
@@ -1448,9 +1913,15 @@
           </a:ln>
         </p:spPr>
         <p:style>
-          <a:lnRef idx="0"/>
-          <a:fillRef idx="0"/>
-          <a:effectRef idx="0"/>
+          <a:lnRef idx="0">
+            <a:scrgbClr r="0" g="0" b="0"/>
+          </a:lnRef>
+          <a:fillRef idx="0">
+            <a:scrgbClr r="0" g="0" b="0"/>
+          </a:fillRef>
+          <a:effectRef idx="0">
+            <a:scrgbClr r="0" g="0" b="0"/>
+          </a:effectRef>
           <a:fontRef idx="minor"/>
         </p:style>
       </p:sp>
@@ -1474,9 +1945,15 @@
           </a:ln>
         </p:spPr>
         <p:style>
-          <a:lnRef idx="0"/>
-          <a:fillRef idx="0"/>
-          <a:effectRef idx="0"/>
+          <a:lnRef idx="0">
+            <a:scrgbClr r="0" g="0" b="0"/>
+          </a:lnRef>
+          <a:fillRef idx="0">
+            <a:scrgbClr r="0" g="0" b="0"/>
+          </a:fillRef>
+          <a:effectRef idx="0">
+            <a:scrgbClr r="0" g="0" b="0"/>
+          </a:effectRef>
           <a:fontRef idx="minor"/>
         </p:style>
       </p:sp>
@@ -1500,7 +1977,8 @@
           </a:ln>
         </p:spPr>
         <p:txBody>
-          <a:bodyPr lIns="90000" rIns="90000" tIns="45000" bIns="45000" anchor="ctr"/>
+          <a:bodyPr lIns="90000" tIns="45000" rIns="90000" bIns="45000" anchor="ctr"/>
+          <a:lstStyle/>
           <a:p>
             <a:pPr algn="ctr"/>
             <a:r>
@@ -1521,6 +1999,9 @@
       </p:sp>
     </p:spTree>
   </p:cSld>
+  <p:clrMapOvr>
+    <a:masterClrMapping/>
+  </p:clrMapOvr>
   <p:timing>
     <p:tnLst>
       <p:par>
@@ -1529,14 +2010,14 @@
             <p:seq>
               <p:cTn id="2" nodeType="mainSeq"/>
               <p:prevCondLst>
-                <p:cond delay="0" evt="onPrev">
+                <p:cond evt="onPrev" delay="0">
                   <p:tgtEl>
                     <p:sldTgt/>
                   </p:tgtEl>
                 </p:cond>
               </p:prevCondLst>
               <p:nextCondLst>
-                <p:cond delay="0" evt="onNext">
+                <p:cond evt="onNext" delay="0">
                   <p:tgtEl>
                     <p:sldTgt/>
                   </p:tgtEl>
@@ -1552,7 +2033,7 @@
 </file>
 
 <file path=ppt/slides/slide2.xml><?xml version="1.0" encoding="utf-8"?>
-<p:sld xmlns:a="http://schemas.openxmlformats.org/drawingml/2006/main" xmlns:p="http://schemas.openxmlformats.org/presentationml/2006/main" xmlns:r="http://schemas.openxmlformats.org/officeDocument/2006/relationships">
+<p:sld xmlns:a="http://schemas.openxmlformats.org/drawingml/2006/main" xmlns:r="http://schemas.openxmlformats.org/officeDocument/2006/relationships" xmlns:p="http://schemas.openxmlformats.org/presentationml/2006/main">
   <p:cSld>
     <p:spTree>
       <p:nvGrpSpPr>
@@ -1588,7 +2069,8 @@
           </a:ln>
         </p:spPr>
         <p:txBody>
-          <a:bodyPr lIns="0" rIns="0" tIns="0" bIns="0" anchor="ctr"/>
+          <a:bodyPr lIns="0" tIns="0" rIns="0" bIns="0" anchor="ctr"/>
+          <a:lstStyle/>
           <a:p>
             <a:pPr algn="ctr"/>
             <a:r>
@@ -1621,125 +2103,117 @@
           </a:ln>
         </p:spPr>
         <p:txBody>
-          <a:bodyPr lIns="0" rIns="0" tIns="0" bIns="0"/>
+          <a:bodyPr lIns="0" tIns="0" rIns="0" bIns="0"/>
+          <a:lstStyle/>
           <a:p>
             <a:pPr marL="432000" indent="-324000">
               <a:buClr>
-                <a:srgbClr val="ffffff"/>
+                <a:srgbClr val="FFFFFF"/>
               </a:buClr>
               <a:buSzPct val="45000"/>
               <a:buFont typeface="Wingdings" charset="2"/>
               <a:buChar char=""/>
             </a:pPr>
             <a:r>
-              <a:rPr lang="en-US" sz="3200" spc="-1">
+              <a:rPr lang="en-US" sz="3200" spc="-1" dirty="0">
                 <a:latin typeface="Arial"/>
               </a:rPr>
-              <a:t>Should CSUN require internships for </a:t>
+              <a:t>Should CSUN require internships for 
+graduation?</a:t>
             </a:r>
-            <a:r>
-              <a:rPr lang="en-US" sz="3200" spc="-1">
-                <a:latin typeface="Arial"/>
-              </a:rPr>
-              <a:t>
-</a:t>
-            </a:r>
-            <a:r>
-              <a:rPr lang="en-US" sz="3200" spc="-1">
-                <a:latin typeface="Arial"/>
-              </a:rPr>
-              <a:t>graduation?</a:t>
-            </a:r>
-            <a:endParaRPr/>
+            <a:endParaRPr dirty="0"/>
           </a:p>
           <a:p>
             <a:pPr marL="432000" indent="-324000">
               <a:buClr>
-                <a:srgbClr val="ffffff"/>
+                <a:srgbClr val="FFFFFF"/>
               </a:buClr>
               <a:buSzPct val="45000"/>
               <a:buFont typeface="Wingdings" charset="2"/>
               <a:buChar char=""/>
             </a:pPr>
             <a:r>
-              <a:rPr lang="en-US" sz="3200" spc="-1">
+              <a:rPr lang="en-US" sz="3200" spc="-1" dirty="0">
                 <a:latin typeface="Arial"/>
               </a:rPr>
               <a:t>What are the benefits?</a:t>
             </a:r>
-            <a:endParaRPr/>
+            <a:endParaRPr dirty="0"/>
           </a:p>
           <a:p>
             <a:pPr marL="432000" indent="-324000">
               <a:buClr>
-                <a:srgbClr val="ffffff"/>
+                <a:srgbClr val="FFFFFF"/>
               </a:buClr>
               <a:buSzPct val="45000"/>
               <a:buFont typeface="Wingdings" charset="2"/>
               <a:buChar char=""/>
             </a:pPr>
             <a:r>
-              <a:rPr lang="en-US" sz="3200" spc="-1">
+              <a:rPr lang="en-US" sz="3200" spc="-1" dirty="0">
                 <a:latin typeface="Arial"/>
               </a:rPr>
               <a:t>What are the drawbacks?</a:t>
             </a:r>
-            <a:endParaRPr/>
+            <a:endParaRPr dirty="0"/>
           </a:p>
           <a:p>
             <a:pPr marL="432000" indent="-324000">
               <a:buClr>
-                <a:srgbClr val="ffffff"/>
+                <a:srgbClr val="FFFFFF"/>
               </a:buClr>
               <a:buSzPct val="45000"/>
               <a:buFont typeface="Wingdings" charset="2"/>
               <a:buChar char=""/>
             </a:pPr>
             <a:r>
-              <a:rPr lang="en-US" sz="3200" spc="-1">
+              <a:rPr lang="en-US" sz="3200" spc="-1" dirty="0">
                 <a:latin typeface="Arial"/>
               </a:rPr>
               <a:t>What will it cost?</a:t>
             </a:r>
-            <a:endParaRPr/>
+            <a:endParaRPr dirty="0"/>
           </a:p>
           <a:p>
             <a:pPr marL="432000" indent="-324000">
               <a:buClr>
-                <a:srgbClr val="ffffff"/>
+                <a:srgbClr val="FFFFFF"/>
               </a:buClr>
               <a:buSzPct val="45000"/>
               <a:buFont typeface="Wingdings" charset="2"/>
               <a:buChar char=""/>
             </a:pPr>
             <a:r>
-              <a:rPr lang="en-US" sz="3200" spc="-1">
+              <a:rPr lang="en-US" sz="3200" spc="-1" dirty="0">
                 <a:latin typeface="Arial"/>
               </a:rPr>
               <a:t>How can it be done?</a:t>
             </a:r>
-            <a:endParaRPr/>
+            <a:endParaRPr dirty="0"/>
           </a:p>
         </p:txBody>
       </p:sp>
     </p:spTree>
   </p:cSld>
+  <p:clrMapOvr>
+    <a:masterClrMapping/>
+  </p:clrMapOvr>
   <p:timing>
     <p:tnLst>
       <p:par>
-        <p:cTn id="3" dur="indefinite" restart="never" nodeType="tmRoot">
+        <p:cTn id="1" dur="indefinite" restart="never" nodeType="tmRoot">
           <p:childTnLst>
             <p:seq>
-              <p:cTn id="4" nodeType="mainSeq"/>
+              <p:cTn id="2" nodeType="mainSeq"/>
               <p:prevCondLst>
-                <p:cond delay="0" evt="onPrev">
+                <p:cond evt="onPrev" delay="0">
                   <p:tgtEl>
                     <p:sldTgt/>
                   </p:tgtEl>
                 </p:cond>
               </p:prevCondLst>
               <p:nextCondLst>
-                <p:cond delay="0" evt="onNext">
+                <p:cond evt="onNext" delay="0">
                   <p:tgtEl>
                     <p:sldTgt/>
                   </p:tgtEl>
@@ -1755,7 +2229,7 @@
 </file>
 
 <file path=ppt/slides/slide3.xml><?xml version="1.0" encoding="utf-8"?>
-<p:sld xmlns:a="http://schemas.openxmlformats.org/drawingml/2006/main" xmlns:p="http://schemas.openxmlformats.org/presentationml/2006/main" xmlns:r="http://schemas.openxmlformats.org/officeDocument/2006/relationships">
+<p:sld xmlns:a="http://schemas.openxmlformats.org/drawingml/2006/main" xmlns:r="http://schemas.openxmlformats.org/officeDocument/2006/relationships" xmlns:p="http://schemas.openxmlformats.org/presentationml/2006/main">
   <p:cSld>
     <p:spTree>
       <p:nvGrpSpPr>
@@ -1791,7 +2265,8 @@
           </a:ln>
         </p:spPr>
         <p:txBody>
-          <a:bodyPr lIns="0" rIns="0" tIns="0" bIns="0" anchor="ctr"/>
+          <a:bodyPr lIns="0" tIns="0" rIns="0" bIns="0" anchor="ctr"/>
+          <a:lstStyle/>
           <a:p>
             <a:pPr algn="ctr"/>
             <a:r>
@@ -1824,11 +2299,12 @@
           </a:ln>
         </p:spPr>
         <p:txBody>
-          <a:bodyPr lIns="0" rIns="0" tIns="0" bIns="0"/>
+          <a:bodyPr lIns="0" tIns="0" rIns="0" bIns="0"/>
+          <a:lstStyle/>
           <a:p>
             <a:pPr marL="432000" indent="-324000">
               <a:buClr>
-                <a:srgbClr val="ffffff"/>
+                <a:srgbClr val="FFFFFF"/>
               </a:buClr>
               <a:buSzPct val="45000"/>
               <a:buFont typeface="Wingdings" charset="2"/>
@@ -1845,7 +2321,7 @@
           <a:p>
             <a:pPr marL="432000" indent="-324000">
               <a:buClr>
-                <a:srgbClr val="ffffff"/>
+                <a:srgbClr val="FFFFFF"/>
               </a:buClr>
               <a:buSzPct val="45000"/>
               <a:buFont typeface="Wingdings" charset="2"/>
@@ -1862,7 +2338,7 @@
           <a:p>
             <a:pPr marL="432000" indent="-324000">
               <a:buClr>
-                <a:srgbClr val="ffffff"/>
+                <a:srgbClr val="FFFFFF"/>
               </a:buClr>
               <a:buSzPct val="45000"/>
               <a:buFont typeface="Wingdings" charset="2"/>
@@ -1880,22 +2356,25 @@
       </p:sp>
     </p:spTree>
   </p:cSld>
+  <p:clrMapOvr>
+    <a:masterClrMapping/>
+  </p:clrMapOvr>
   <p:timing>
     <p:tnLst>
       <p:par>
-        <p:cTn id="5" dur="indefinite" restart="never" nodeType="tmRoot">
+        <p:cTn id="1" dur="indefinite" restart="never" nodeType="tmRoot">
           <p:childTnLst>
             <p:seq>
-              <p:cTn id="6" nodeType="mainSeq"/>
+              <p:cTn id="2" nodeType="mainSeq"/>
               <p:prevCondLst>
-                <p:cond delay="0" evt="onPrev">
+                <p:cond evt="onPrev" delay="0">
                   <p:tgtEl>
                     <p:sldTgt/>
                   </p:tgtEl>
                 </p:cond>
               </p:prevCondLst>
               <p:nextCondLst>
-                <p:cond delay="0" evt="onNext">
+                <p:cond evt="onNext" delay="0">
                   <p:tgtEl>
                     <p:sldTgt/>
                   </p:tgtEl>
@@ -1921,46 +2400,106 @@
         <a:sysClr val="window" lastClr="FFFFFF"/>
       </a:lt1>
       <a:dk2>
-        <a:srgbClr val="1F497D"/>
+        <a:srgbClr val="44546A"/>
       </a:dk2>
       <a:lt2>
-        <a:srgbClr val="EEECE1"/>
+        <a:srgbClr val="E7E6E6"/>
       </a:lt2>
       <a:accent1>
-        <a:srgbClr val="4F81BD"/>
+        <a:srgbClr val="5B9BD5"/>
       </a:accent1>
       <a:accent2>
-        <a:srgbClr val="C0504D"/>
+        <a:srgbClr val="ED7D31"/>
       </a:accent2>
       <a:accent3>
-        <a:srgbClr val="9BBB59"/>
+        <a:srgbClr val="A5A5A5"/>
       </a:accent3>
       <a:accent4>
-        <a:srgbClr val="8064A2"/>
+        <a:srgbClr val="FFC000"/>
       </a:accent4>
       <a:accent5>
-        <a:srgbClr val="4BACC6"/>
+        <a:srgbClr val="4472C4"/>
       </a:accent5>
       <a:accent6>
-        <a:srgbClr val="F79646"/>
+        <a:srgbClr val="70AD47"/>
       </a:accent6>
       <a:hlink>
-        <a:srgbClr val="0000FF"/>
+        <a:srgbClr val="0563C1"/>
       </a:hlink>
       <a:folHlink>
-        <a:srgbClr val="800080"/>
+        <a:srgbClr val="954F72"/>
       </a:folHlink>
     </a:clrScheme>
     <a:fontScheme name="Office">
       <a:majorFont>
-        <a:latin typeface="Arial"/>
-        <a:ea typeface="DejaVu Sans"/>
-        <a:cs typeface="DejaVu Sans"/>
+        <a:latin typeface="Calibri Light" panose="020F0302020204030204"/>
+        <a:ea typeface=""/>
+        <a:cs typeface=""/>
+        <a:font script="Jpan" typeface="ＭＳ Ｐゴシック"/>
+        <a:font script="Hang" typeface="맑은 고딕"/>
+        <a:font script="Hans" typeface="宋体"/>
+        <a:font script="Hant" typeface="新細明體"/>
+        <a:font script="Arab" typeface="Times New Roman"/>
+        <a:font script="Hebr" typeface="Times New Roman"/>
+        <a:font script="Thai" typeface="Angsana New"/>
+        <a:font script="Ethi" typeface="Nyala"/>
+        <a:font script="Beng" typeface="Vrinda"/>
+        <a:font script="Gujr" typeface="Shruti"/>
+        <a:font script="Khmr" typeface="MoolBoran"/>
+        <a:font script="Knda" typeface="Tunga"/>
+        <a:font script="Guru" typeface="Raavi"/>
+        <a:font script="Cans" typeface="Euphemia"/>
+        <a:font script="Cher" typeface="Plantagenet Cherokee"/>
+        <a:font script="Yiii" typeface="Microsoft Yi Baiti"/>
+        <a:font script="Tibt" typeface="Microsoft Himalaya"/>
+        <a:font script="Thaa" typeface="MV Boli"/>
+        <a:font script="Deva" typeface="Mangal"/>
+        <a:font script="Telu" typeface="Gautami"/>
+        <a:font script="Taml" typeface="Latha"/>
+        <a:font script="Syrc" typeface="Estrangelo Edessa"/>
+        <a:font script="Orya" typeface="Kalinga"/>
+        <a:font script="Mlym" typeface="Kartika"/>
+        <a:font script="Laoo" typeface="DokChampa"/>
+        <a:font script="Sinh" typeface="Iskoola Pota"/>
+        <a:font script="Mong" typeface="Mongolian Baiti"/>
+        <a:font script="Viet" typeface="Times New Roman"/>
+        <a:font script="Uigh" typeface="Microsoft Uighur"/>
+        <a:font script="Geor" typeface="Sylfaen"/>
       </a:majorFont>
       <a:minorFont>
-        <a:latin typeface="Arial"/>
-        <a:ea typeface="DejaVu Sans"/>
-        <a:cs typeface="DejaVu Sans"/>
+        <a:latin typeface="Calibri" panose="020F0502020204030204"/>
+        <a:ea typeface=""/>
+        <a:cs typeface=""/>
+        <a:font script="Jpan" typeface="ＭＳ Ｐゴシック"/>
+        <a:font script="Hang" typeface="맑은 고딕"/>
+        <a:font script="Hans" typeface="宋体"/>
+        <a:font script="Hant" typeface="新細明體"/>
+        <a:font script="Arab" typeface="Arial"/>
+        <a:font script="Hebr" typeface="Arial"/>
+        <a:font script="Thai" typeface="Cordia New"/>
+        <a:font script="Ethi" typeface="Nyala"/>
+        <a:font script="Beng" typeface="Vrinda"/>
+        <a:font script="Gujr" typeface="Shruti"/>
+        <a:font script="Khmr" typeface="DaunPenh"/>
+        <a:font script="Knda" typeface="Tunga"/>
+        <a:font script="Guru" typeface="Raavi"/>
+        <a:font script="Cans" typeface="Euphemia"/>
+        <a:font script="Cher" typeface="Plantagenet Cherokee"/>
+        <a:font script="Yiii" typeface="Microsoft Yi Baiti"/>
+        <a:font script="Tibt" typeface="Microsoft Himalaya"/>
+        <a:font script="Thaa" typeface="MV Boli"/>
+        <a:font script="Deva" typeface="Mangal"/>
+        <a:font script="Telu" typeface="Gautami"/>
+        <a:font script="Taml" typeface="Latha"/>
+        <a:font script="Syrc" typeface="Estrangelo Edessa"/>
+        <a:font script="Orya" typeface="Kalinga"/>
+        <a:font script="Mlym" typeface="Kartika"/>
+        <a:font script="Laoo" typeface="DokChampa"/>
+        <a:font script="Sinh" typeface="Iskoola Pota"/>
+        <a:font script="Mong" typeface="Mongolian Baiti"/>
+        <a:font script="Viet" typeface="Arial"/>
+        <a:font script="Uigh" typeface="Microsoft Uighur"/>
+        <a:font script="Geor" typeface="Sylfaen"/>
       </a:minorFont>
     </a:fontScheme>
     <a:fmtScheme name="Office">
@@ -1972,163 +2511,141 @@
           <a:gsLst>
             <a:gs pos="0">
               <a:schemeClr val="phClr">
-                <a:tint val="50000"/>
-                <a:satMod val="300000"/>
+                <a:lumMod val="110000"/>
+                <a:satMod val="105000"/>
+                <a:tint val="67000"/>
               </a:schemeClr>
             </a:gs>
-            <a:gs pos="35000">
+            <a:gs pos="50000">
               <a:schemeClr val="phClr">
-                <a:tint val="37000"/>
-                <a:satMod val="300000"/>
+                <a:lumMod val="105000"/>
+                <a:satMod val="103000"/>
+                <a:tint val="73000"/>
               </a:schemeClr>
             </a:gs>
             <a:gs pos="100000">
               <a:schemeClr val="phClr">
-                <a:tint val="15000"/>
-                <a:satMod val="350000"/>
+                <a:lumMod val="105000"/>
+                <a:satMod val="109000"/>
+                <a:tint val="81000"/>
               </a:schemeClr>
             </a:gs>
           </a:gsLst>
-          <a:lin ang="16200000" scaled="1"/>
+          <a:lin ang="5400000" scaled="0"/>
         </a:gradFill>
         <a:gradFill rotWithShape="1">
           <a:gsLst>
             <a:gs pos="0">
               <a:schemeClr val="phClr">
-                <a:shade val="51000"/>
-                <a:satMod val="130000"/>
+                <a:satMod val="103000"/>
+                <a:lumMod val="102000"/>
+                <a:tint val="94000"/>
               </a:schemeClr>
             </a:gs>
-            <a:gs pos="80000">
+            <a:gs pos="50000">
               <a:schemeClr val="phClr">
-                <a:shade val="93000"/>
-                <a:satMod val="130000"/>
+                <a:satMod val="110000"/>
+                <a:lumMod val="100000"/>
+                <a:shade val="100000"/>
               </a:schemeClr>
             </a:gs>
             <a:gs pos="100000">
               <a:schemeClr val="phClr">
-                <a:shade val="94000"/>
-                <a:satMod val="135000"/>
+                <a:lumMod val="99000"/>
+                <a:satMod val="120000"/>
+                <a:shade val="78000"/>
               </a:schemeClr>
             </a:gs>
           </a:gsLst>
-          <a:lin ang="16200000" scaled="0"/>
+          <a:lin ang="5400000" scaled="0"/>
         </a:gradFill>
       </a:fillStyleLst>
       <a:lnStyleLst>
-        <a:ln w="9525" cap="flat" cmpd="sng" algn="ctr">
-          <a:solidFill>
-            <a:schemeClr val="phClr">
-              <a:shade val="95000"/>
-              <a:satMod val="105000"/>
-            </a:schemeClr>
-          </a:solidFill>
-          <a:prstDash val="solid"/>
-        </a:ln>
-        <a:ln w="25400" cap="flat" cmpd="sng" algn="ctr">
+        <a:ln w="6350" cap="flat" cmpd="sng" algn="ctr">
           <a:solidFill>
             <a:schemeClr val="phClr"/>
           </a:solidFill>
           <a:prstDash val="solid"/>
+          <a:miter lim="800000"/>
         </a:ln>
-        <a:ln w="38100" cap="flat" cmpd="sng" algn="ctr">
+        <a:ln w="12700" cap="flat" cmpd="sng" algn="ctr">
           <a:solidFill>
             <a:schemeClr val="phClr"/>
           </a:solidFill>
           <a:prstDash val="solid"/>
+          <a:miter lim="800000"/>
+        </a:ln>
+        <a:ln w="19050" cap="flat" cmpd="sng" algn="ctr">
+          <a:solidFill>
+            <a:schemeClr val="phClr"/>
+          </a:solidFill>
+          <a:prstDash val="solid"/>
+          <a:miter lim="800000"/>
         </a:ln>
       </a:lnStyleLst>
       <a:effectStyleLst>
         <a:effectStyle>
+          <a:effectLst/>
+        </a:effectStyle>
+        <a:effectStyle>
+          <a:effectLst/>
+        </a:effectStyle>
+        <a:effectStyle>
           <a:effectLst>
-            <a:outerShdw blurRad="40000" dist="20000" dir="5400000" rotWithShape="0">
+            <a:outerShdw blurRad="57150" dist="19050" dir="5400000" algn="ctr" rotWithShape="0">
               <a:srgbClr val="000000">
-                <a:alpha val="38000"/>
+                <a:alpha val="63000"/>
               </a:srgbClr>
             </a:outerShdw>
           </a:effectLst>
-        </a:effectStyle>
-        <a:effectStyle>
-          <a:effectLst>
-            <a:outerShdw blurRad="40000" dist="23000" dir="5400000" rotWithShape="0">
-              <a:srgbClr val="000000">
-                <a:alpha val="35000"/>
-              </a:srgbClr>
-            </a:outerShdw>
-          </a:effectLst>
-        </a:effectStyle>
-        <a:effectStyle>
-          <a:effectLst>
-            <a:outerShdw blurRad="40000" dist="23000" dir="5400000" rotWithShape="0">
-              <a:srgbClr val="000000">
-                <a:alpha val="35000"/>
-              </a:srgbClr>
-            </a:outerShdw>
-          </a:effectLst>
-          <a:scene3d>
-            <a:camera prst="orthographicFront">
-              <a:rot lat="0" lon="0" rev="0"/>
-            </a:camera>
-            <a:lightRig rig="threePt" dir="t">
-              <a:rot lat="0" lon="0" rev="1200000"/>
-            </a:lightRig>
-          </a:scene3d>
-          <a:sp3d>
-            <a:bevelT w="63500" h="25400"/>
-          </a:sp3d>
         </a:effectStyle>
       </a:effectStyleLst>
       <a:bgFillStyleLst>
         <a:solidFill>
           <a:schemeClr val="phClr"/>
         </a:solidFill>
+        <a:solidFill>
+          <a:schemeClr val="phClr">
+            <a:tint val="95000"/>
+            <a:satMod val="170000"/>
+          </a:schemeClr>
+        </a:solidFill>
         <a:gradFill rotWithShape="1">
           <a:gsLst>
             <a:gs pos="0">
               <a:schemeClr val="phClr">
-                <a:tint val="40000"/>
-                <a:satMod val="350000"/>
+                <a:tint val="93000"/>
+                <a:satMod val="150000"/>
+                <a:shade val="98000"/>
+                <a:lumMod val="102000"/>
               </a:schemeClr>
             </a:gs>
-            <a:gs pos="40000">
+            <a:gs pos="50000">
               <a:schemeClr val="phClr">
-                <a:tint val="45000"/>
-                <a:shade val="99000"/>
-                <a:satMod val="350000"/>
+                <a:tint val="98000"/>
+                <a:satMod val="130000"/>
+                <a:shade val="90000"/>
+                <a:lumMod val="103000"/>
               </a:schemeClr>
             </a:gs>
             <a:gs pos="100000">
               <a:schemeClr val="phClr">
-                <a:shade val="20000"/>
-                <a:satMod val="255000"/>
+                <a:shade val="63000"/>
+                <a:satMod val="120000"/>
               </a:schemeClr>
             </a:gs>
           </a:gsLst>
-          <a:path path="circle">
-            <a:fillToRect l="50000" t="-80000" r="50000" b="180000"/>
-          </a:path>
-        </a:gradFill>
-        <a:gradFill rotWithShape="1">
-          <a:gsLst>
-            <a:gs pos="0">
-              <a:schemeClr val="phClr">
-                <a:tint val="80000"/>
-                <a:satMod val="300000"/>
-              </a:schemeClr>
-            </a:gs>
-            <a:gs pos="100000">
-              <a:schemeClr val="phClr">
-                <a:shade val="30000"/>
-                <a:satMod val="200000"/>
-              </a:schemeClr>
-            </a:gs>
-          </a:gsLst>
-          <a:path path="circle">
-            <a:fillToRect l="50000" t="50000" r="50000" b="50000"/>
-          </a:path>
+          <a:lin ang="5400000" scaled="0"/>
         </a:gradFill>
       </a:bgFillStyleLst>
     </a:fmtScheme>
   </a:themeElements>
+  <a:objectDefaults/>
+  <a:extraClrSchemeLst/>
+  <a:extLst>
+    <a:ext uri="{05A4C25C-085E-4340-85A3-A5531E510DB2}">
+      <thm15:themeFamily xmlns:thm15="http://schemas.microsoft.com/office/thememl/2012/main" name="Office Theme" id="{62F939B6-93AF-4DB8-9C6B-D6C7DFDC589F}" vid="{4A3C46E8-61CC-4603-A589-7422A47A8E4A}"/>
+    </a:ext>
+  </a:extLst>
 </a:theme>
 </file>
</xml_diff>